<commit_message>
figure re-export for high resolution. minor correction in manuscript (Using-->With)
</commit_message>
<xml_diff>
--- a/meas_setup.pptx
+++ b/meas_setup.pptx
@@ -243,7 +243,7 @@
           <a:p>
             <a:fld id="{0E856FFE-6B55-4176-8CE4-68BFDDCEED11}" type="datetimeFigureOut">
               <a:rPr lang="ko-KR" altLang="en-US" smtClean="0"/>
-              <a:t>2017. 8. 20.</a:t>
+              <a:t>2017-09-04</a:t>
             </a:fld>
             <a:endParaRPr lang="ko-KR" altLang="en-US" dirty="0"/>
           </a:p>
@@ -408,7 +408,7 @@
           <a:p>
             <a:fld id="{0E856FFE-6B55-4176-8CE4-68BFDDCEED11}" type="datetimeFigureOut">
               <a:rPr lang="ko-KR" altLang="en-US" smtClean="0"/>
-              <a:t>2017. 8. 20.</a:t>
+              <a:t>2017-09-04</a:t>
             </a:fld>
             <a:endParaRPr lang="ko-KR" altLang="en-US" dirty="0"/>
           </a:p>
@@ -583,7 +583,7 @@
           <a:p>
             <a:fld id="{0E856FFE-6B55-4176-8CE4-68BFDDCEED11}" type="datetimeFigureOut">
               <a:rPr lang="ko-KR" altLang="en-US" smtClean="0"/>
-              <a:t>2017. 8. 20.</a:t>
+              <a:t>2017-09-04</a:t>
             </a:fld>
             <a:endParaRPr lang="ko-KR" altLang="en-US" dirty="0"/>
           </a:p>
@@ -748,7 +748,7 @@
           <a:p>
             <a:fld id="{0E856FFE-6B55-4176-8CE4-68BFDDCEED11}" type="datetimeFigureOut">
               <a:rPr lang="ko-KR" altLang="en-US" smtClean="0"/>
-              <a:t>2017. 8. 20.</a:t>
+              <a:t>2017-09-04</a:t>
             </a:fld>
             <a:endParaRPr lang="ko-KR" altLang="en-US" dirty="0"/>
           </a:p>
@@ -989,7 +989,7 @@
           <a:p>
             <a:fld id="{0E856FFE-6B55-4176-8CE4-68BFDDCEED11}" type="datetimeFigureOut">
               <a:rPr lang="ko-KR" altLang="en-US" smtClean="0"/>
-              <a:t>2017. 8. 20.</a:t>
+              <a:t>2017-09-04</a:t>
             </a:fld>
             <a:endParaRPr lang="ko-KR" altLang="en-US" dirty="0"/>
           </a:p>
@@ -1216,7 +1216,7 @@
           <a:p>
             <a:fld id="{0E856FFE-6B55-4176-8CE4-68BFDDCEED11}" type="datetimeFigureOut">
               <a:rPr lang="ko-KR" altLang="en-US" smtClean="0"/>
-              <a:t>2017. 8. 20.</a:t>
+              <a:t>2017-09-04</a:t>
             </a:fld>
             <a:endParaRPr lang="ko-KR" altLang="en-US" dirty="0"/>
           </a:p>
@@ -1578,7 +1578,7 @@
           <a:p>
             <a:fld id="{0E856FFE-6B55-4176-8CE4-68BFDDCEED11}" type="datetimeFigureOut">
               <a:rPr lang="ko-KR" altLang="en-US" smtClean="0"/>
-              <a:t>2017. 8. 20.</a:t>
+              <a:t>2017-09-04</a:t>
             </a:fld>
             <a:endParaRPr lang="ko-KR" altLang="en-US" dirty="0"/>
           </a:p>
@@ -1691,7 +1691,7 @@
           <a:p>
             <a:fld id="{0E856FFE-6B55-4176-8CE4-68BFDDCEED11}" type="datetimeFigureOut">
               <a:rPr lang="ko-KR" altLang="en-US" smtClean="0"/>
-              <a:t>2017. 8. 20.</a:t>
+              <a:t>2017-09-04</a:t>
             </a:fld>
             <a:endParaRPr lang="ko-KR" altLang="en-US" dirty="0"/>
           </a:p>
@@ -1781,7 +1781,7 @@
           <a:p>
             <a:fld id="{0E856FFE-6B55-4176-8CE4-68BFDDCEED11}" type="datetimeFigureOut">
               <a:rPr lang="ko-KR" altLang="en-US" smtClean="0"/>
-              <a:t>2017. 8. 20.</a:t>
+              <a:t>2017-09-04</a:t>
             </a:fld>
             <a:endParaRPr lang="ko-KR" altLang="en-US" dirty="0"/>
           </a:p>
@@ -2053,7 +2053,7 @@
           <a:p>
             <a:fld id="{0E856FFE-6B55-4176-8CE4-68BFDDCEED11}" type="datetimeFigureOut">
               <a:rPr lang="ko-KR" altLang="en-US" smtClean="0"/>
-              <a:t>2017. 8. 20.</a:t>
+              <a:t>2017-09-04</a:t>
             </a:fld>
             <a:endParaRPr lang="ko-KR" altLang="en-US" dirty="0"/>
           </a:p>
@@ -2305,7 +2305,7 @@
           <a:p>
             <a:fld id="{0E856FFE-6B55-4176-8CE4-68BFDDCEED11}" type="datetimeFigureOut">
               <a:rPr lang="ko-KR" altLang="en-US" smtClean="0"/>
-              <a:t>2017. 8. 20.</a:t>
+              <a:t>2017-09-04</a:t>
             </a:fld>
             <a:endParaRPr lang="ko-KR" altLang="en-US" dirty="0"/>
           </a:p>
@@ -2513,7 +2513,7 @@
           <a:p>
             <a:fld id="{0E856FFE-6B55-4176-8CE4-68BFDDCEED11}" type="datetimeFigureOut">
               <a:rPr lang="ko-KR" altLang="en-US" smtClean="0"/>
-              <a:t>2017. 8. 20.</a:t>
+              <a:t>2017-09-04</a:t>
             </a:fld>
             <a:endParaRPr lang="ko-KR" altLang="en-US" dirty="0"/>
           </a:p>
@@ -2918,36 +2918,6 @@
           <a:chExt cx="0" cy="0"/>
         </a:xfrm>
       </p:grpSpPr>
-      <p:pic>
-        <p:nvPicPr>
-          <p:cNvPr id="4" name="그림 3"/>
-          <p:cNvPicPr>
-            <a:picLocks noChangeAspect="1"/>
-          </p:cNvPicPr>
-          <p:nvPr/>
-        </p:nvPicPr>
-        <p:blipFill>
-          <a:blip r:embed="rId2">
-            <a:extLst>
-              <a:ext uri="{28A0092B-C50C-407E-A947-70E740481C1C}">
-                <a14:useLocalDpi xmlns:a14="http://schemas.microsoft.com/office/drawing/2010/main" val="0"/>
-              </a:ext>
-            </a:extLst>
-          </a:blip>
-          <a:stretch>
-            <a:fillRect/>
-          </a:stretch>
-        </p:blipFill>
-        <p:spPr>
-          <a:xfrm>
-            <a:off x="4434700" y="1571774"/>
-            <a:ext cx="2324100" cy="2295525"/>
-          </a:xfrm>
-          <a:prstGeom prst="rect">
-            <a:avLst/>
-          </a:prstGeom>
-        </p:spPr>
-      </p:pic>
       <p:sp>
         <p:nvSpPr>
           <p:cNvPr id="69" name="TextBox 68"/>
@@ -4727,7 +4697,7 @@
             </a:xfrm>
             <a:prstGeom prst="bentConnector3">
               <a:avLst>
-                <a:gd name="adj1" fmla="val 50000"/>
+                <a:gd name="adj1" fmla="val 45808"/>
               </a:avLst>
             </a:prstGeom>
             <a:ln w="19050">
@@ -4840,7 +4810,7 @@
             </a:xfrm>
             <a:prstGeom prst="bentConnector3">
               <a:avLst>
-                <a:gd name="adj1" fmla="val 69440"/>
+                <a:gd name="adj1" fmla="val 65477"/>
               </a:avLst>
             </a:prstGeom>
             <a:ln w="19050">
@@ -6167,6 +6137,30 @@
           </p:txBody>
         </p:sp>
       </p:grpSp>
+      <p:pic>
+        <p:nvPicPr>
+          <p:cNvPr id="3" name="그림 2"/>
+          <p:cNvPicPr>
+            <a:picLocks noChangeAspect="1"/>
+          </p:cNvPicPr>
+          <p:nvPr/>
+        </p:nvPicPr>
+        <p:blipFill>
+          <a:blip r:embed="rId2"/>
+          <a:stretch>
+            <a:fillRect/>
+          </a:stretch>
+        </p:blipFill>
+        <p:spPr>
+          <a:xfrm>
+            <a:off x="4422450" y="1745221"/>
+            <a:ext cx="2162022" cy="2154957"/>
+          </a:xfrm>
+          <a:prstGeom prst="rect">
+            <a:avLst/>
+          </a:prstGeom>
+        </p:spPr>
+      </p:pic>
     </p:spTree>
     <p:extLst>
       <p:ext uri="{BB962C8B-B14F-4D97-AF65-F5344CB8AC3E}">

</xml_diff>